<commit_message>
Module 03 ready for release; ready to launch public
</commit_message>
<xml_diff>
--- a/Slides/Lesson 2.6 Working with images and scenes.pptx
+++ b/Slides/Lesson 2.6 Working with images and scenes.pptx
@@ -2,7 +2,7 @@
 <file path=ppt/presentation.xml><?xml version="1.0" encoding="utf-8"?>
 <p:presentation xmlns:a="http://schemas.openxmlformats.org/drawingml/2006/main" xmlns:r="http://schemas.openxmlformats.org/officeDocument/2006/relationships" xmlns:p="http://schemas.openxmlformats.org/presentationml/2006/main" saveSubsetFonts="1">
   <p:sldMasterIdLst>
-    <p:sldMasterId id="2147483648" r:id="rId1"/>
+    <p:sldMasterId id="2147483661" r:id="rId1"/>
   </p:sldMasterIdLst>
   <p:notesMasterIdLst>
     <p:notesMasterId r:id="rId30"/>
@@ -275,7 +275,7 @@
             <a:fld id="{CF8F25F6-E1EF-4065-8525-42EDEBD9BD22}" type="datetimeFigureOut">
               <a:rPr lang="en-US" smtClean="0"/>
               <a:pPr/>
-              <a:t>8/5/2015</a:t>
+              <a:t>8/20/2015</a:t>
             </a:fld>
             <a:endParaRPr lang="en-US"/>
           </a:p>
@@ -1419,9 +1419,9 @@
           <a:bodyPr/>
           <a:lstStyle/>
           <a:p>
-            <a:fld id="{FA442F42-55E6-4C85-9E2A-70D5560F4424}" type="datetime1">
-              <a:rPr lang="en-US" smtClean="0"/>
-              <a:t>8/5/2015</a:t>
+            <a:fld id="{2F1F79F5-7BEC-496A-AFC7-876E38F64D71}" type="datetime1">
+              <a:rPr lang="en-US" smtClean="0"/>
+              <a:t>8/20/2015</a:t>
             </a:fld>
             <a:endParaRPr lang="en-US"/>
           </a:p>
@@ -1461,9 +1461,8 @@
           <a:bodyPr/>
           <a:lstStyle/>
           <a:p>
-            <a:fld id="{9F4492BD-6A9C-48FC-AC76-0B4FE11194A1}" type="slidenum">
-              <a:rPr lang="en-US" smtClean="0"/>
-              <a:pPr/>
+            <a:fld id="{2AF3B5EA-18B6-4040-9F78-6052AF49C681}" type="slidenum">
+              <a:rPr lang="en-US" smtClean="0"/>
               <a:t>‹#›</a:t>
             </a:fld>
             <a:endParaRPr lang="en-US"/>
@@ -1471,6 +1470,11 @@
         </p:txBody>
       </p:sp>
     </p:spTree>
+    <p:extLst>
+      <p:ext uri="{BB962C8B-B14F-4D97-AF65-F5344CB8AC3E}">
+        <p14:creationId xmlns:p14="http://schemas.microsoft.com/office/powerpoint/2010/main" val="1978701425"/>
+      </p:ext>
+    </p:extLst>
   </p:cSld>
   <p:clrMapOvr>
     <a:masterClrMapping/>
@@ -1486,6 +1490,378 @@
 </file>
 
 <file path=ppt/slideLayouts/slideLayout10.xml><?xml version="1.0" encoding="utf-8"?>
+<p:sldLayout xmlns:a="http://schemas.openxmlformats.org/drawingml/2006/main" xmlns:r="http://schemas.openxmlformats.org/officeDocument/2006/relationships" xmlns:p="http://schemas.openxmlformats.org/presentationml/2006/main" type="blank" preserve="1">
+  <p:cSld name="Blank">
+    <p:spTree>
+      <p:nvGrpSpPr>
+        <p:cNvPr id="1" name=""/>
+        <p:cNvGrpSpPr/>
+        <p:nvPr/>
+      </p:nvGrpSpPr>
+      <p:grpSpPr>
+        <a:xfrm>
+          <a:off x="0" y="0"/>
+          <a:ext cx="0" cy="0"/>
+          <a:chOff x="0" y="0"/>
+          <a:chExt cx="0" cy="0"/>
+        </a:xfrm>
+      </p:grpSpPr>
+      <p:sp>
+        <p:nvSpPr>
+          <p:cNvPr id="2" name="Date Placeholder 1"/>
+          <p:cNvSpPr>
+            <a:spLocks noGrp="1"/>
+          </p:cNvSpPr>
+          <p:nvPr>
+            <p:ph type="dt" sz="half" idx="10"/>
+          </p:nvPr>
+        </p:nvSpPr>
+        <p:spPr/>
+        <p:txBody>
+          <a:bodyPr/>
+          <a:lstStyle/>
+          <a:p>
+            <a:fld id="{0A05703A-7669-4FEA-9056-25299B4D29D4}" type="datetime1">
+              <a:rPr lang="en-US" smtClean="0"/>
+              <a:t>8/20/2015</a:t>
+            </a:fld>
+            <a:endParaRPr lang="en-US"/>
+          </a:p>
+        </p:txBody>
+      </p:sp>
+      <p:sp>
+        <p:nvSpPr>
+          <p:cNvPr id="3" name="Footer Placeholder 2"/>
+          <p:cNvSpPr>
+            <a:spLocks noGrp="1"/>
+          </p:cNvSpPr>
+          <p:nvPr>
+            <p:ph type="ftr" sz="quarter" idx="11"/>
+          </p:nvPr>
+        </p:nvSpPr>
+        <p:spPr/>
+        <p:txBody>
+          <a:bodyPr/>
+          <a:lstStyle/>
+          <a:p>
+            <a:endParaRPr lang="en-US"/>
+          </a:p>
+        </p:txBody>
+      </p:sp>
+      <p:sp>
+        <p:nvSpPr>
+          <p:cNvPr id="4" name="Slide Number Placeholder 3"/>
+          <p:cNvSpPr>
+            <a:spLocks noGrp="1"/>
+          </p:cNvSpPr>
+          <p:nvPr>
+            <p:ph type="sldNum" sz="quarter" idx="12"/>
+          </p:nvPr>
+        </p:nvSpPr>
+        <p:spPr/>
+        <p:txBody>
+          <a:bodyPr/>
+          <a:lstStyle/>
+          <a:p>
+            <a:fld id="{2AF3B5EA-18B6-4040-9F78-6052AF49C681}" type="slidenum">
+              <a:rPr lang="en-US" smtClean="0"/>
+              <a:t>‹#›</a:t>
+            </a:fld>
+            <a:endParaRPr lang="en-US"/>
+          </a:p>
+        </p:txBody>
+      </p:sp>
+    </p:spTree>
+    <p:extLst>
+      <p:ext uri="{BB962C8B-B14F-4D97-AF65-F5344CB8AC3E}">
+        <p14:creationId xmlns:p14="http://schemas.microsoft.com/office/powerpoint/2010/main" val="749433444"/>
+      </p:ext>
+    </p:extLst>
+  </p:cSld>
+  <p:clrMapOvr>
+    <a:masterClrMapping/>
+  </p:clrMapOvr>
+</p:sldLayout>
+</file>
+
+<file path=ppt/slideLayouts/slideLayout11.xml><?xml version="1.0" encoding="utf-8"?>
+<p:sldLayout xmlns:a="http://schemas.openxmlformats.org/drawingml/2006/main" xmlns:r="http://schemas.openxmlformats.org/officeDocument/2006/relationships" xmlns:p="http://schemas.openxmlformats.org/presentationml/2006/main" type="objTx" preserve="1">
+  <p:cSld name="Content with Caption">
+    <p:spTree>
+      <p:nvGrpSpPr>
+        <p:cNvPr id="1" name=""/>
+        <p:cNvGrpSpPr/>
+        <p:nvPr/>
+      </p:nvGrpSpPr>
+      <p:grpSpPr>
+        <a:xfrm>
+          <a:off x="0" y="0"/>
+          <a:ext cx="0" cy="0"/>
+          <a:chOff x="0" y="0"/>
+          <a:chExt cx="0" cy="0"/>
+        </a:xfrm>
+      </p:grpSpPr>
+      <p:sp>
+        <p:nvSpPr>
+          <p:cNvPr id="2" name="Title 1"/>
+          <p:cNvSpPr>
+            <a:spLocks noGrp="1"/>
+          </p:cNvSpPr>
+          <p:nvPr>
+            <p:ph type="title"/>
+          </p:nvPr>
+        </p:nvSpPr>
+        <p:spPr>
+          <a:xfrm>
+            <a:off x="457200" y="273050"/>
+            <a:ext cx="3008313" cy="1162050"/>
+          </a:xfrm>
+        </p:spPr>
+        <p:txBody>
+          <a:bodyPr anchor="b"/>
+          <a:lstStyle>
+            <a:lvl1pPr algn="l">
+              <a:defRPr sz="2000" b="1"/>
+            </a:lvl1pPr>
+          </a:lstStyle>
+          <a:p>
+            <a:r>
+              <a:rPr lang="en-US" smtClean="0"/>
+              <a:t>Click to edit Master title style</a:t>
+            </a:r>
+            <a:endParaRPr lang="en-US"/>
+          </a:p>
+        </p:txBody>
+      </p:sp>
+      <p:sp>
+        <p:nvSpPr>
+          <p:cNvPr id="3" name="Content Placeholder 2"/>
+          <p:cNvSpPr>
+            <a:spLocks noGrp="1"/>
+          </p:cNvSpPr>
+          <p:nvPr>
+            <p:ph idx="1"/>
+          </p:nvPr>
+        </p:nvSpPr>
+        <p:spPr>
+          <a:xfrm>
+            <a:off x="3575050" y="273050"/>
+            <a:ext cx="5111750" cy="5853113"/>
+          </a:xfrm>
+        </p:spPr>
+        <p:txBody>
+          <a:bodyPr/>
+          <a:lstStyle>
+            <a:lvl1pPr>
+              <a:defRPr sz="3200"/>
+            </a:lvl1pPr>
+            <a:lvl2pPr>
+              <a:defRPr sz="2800"/>
+            </a:lvl2pPr>
+            <a:lvl3pPr>
+              <a:defRPr sz="2400"/>
+            </a:lvl3pPr>
+            <a:lvl4pPr>
+              <a:defRPr sz="2000"/>
+            </a:lvl4pPr>
+            <a:lvl5pPr>
+              <a:defRPr sz="2000"/>
+            </a:lvl5pPr>
+            <a:lvl6pPr>
+              <a:defRPr sz="2000"/>
+            </a:lvl6pPr>
+            <a:lvl7pPr>
+              <a:defRPr sz="2000"/>
+            </a:lvl7pPr>
+            <a:lvl8pPr>
+              <a:defRPr sz="2000"/>
+            </a:lvl8pPr>
+            <a:lvl9pPr>
+              <a:defRPr sz="2000"/>
+            </a:lvl9pPr>
+          </a:lstStyle>
+          <a:p>
+            <a:pPr lvl="0"/>
+            <a:r>
+              <a:rPr lang="en-US" smtClean="0"/>
+              <a:t>Click to edit Master text styles</a:t>
+            </a:r>
+          </a:p>
+          <a:p>
+            <a:pPr lvl="1"/>
+            <a:r>
+              <a:rPr lang="en-US" smtClean="0"/>
+              <a:t>Second level</a:t>
+            </a:r>
+          </a:p>
+          <a:p>
+            <a:pPr lvl="2"/>
+            <a:r>
+              <a:rPr lang="en-US" smtClean="0"/>
+              <a:t>Third level</a:t>
+            </a:r>
+          </a:p>
+          <a:p>
+            <a:pPr lvl="3"/>
+            <a:r>
+              <a:rPr lang="en-US" smtClean="0"/>
+              <a:t>Fourth level</a:t>
+            </a:r>
+          </a:p>
+          <a:p>
+            <a:pPr lvl="4"/>
+            <a:r>
+              <a:rPr lang="en-US" smtClean="0"/>
+              <a:t>Fifth level</a:t>
+            </a:r>
+            <a:endParaRPr lang="en-US"/>
+          </a:p>
+        </p:txBody>
+      </p:sp>
+      <p:sp>
+        <p:nvSpPr>
+          <p:cNvPr id="4" name="Text Placeholder 3"/>
+          <p:cNvSpPr>
+            <a:spLocks noGrp="1"/>
+          </p:cNvSpPr>
+          <p:nvPr>
+            <p:ph type="body" sz="half" idx="2"/>
+          </p:nvPr>
+        </p:nvSpPr>
+        <p:spPr>
+          <a:xfrm>
+            <a:off x="457200" y="1435100"/>
+            <a:ext cx="3008313" cy="4691063"/>
+          </a:xfrm>
+        </p:spPr>
+        <p:txBody>
+          <a:bodyPr/>
+          <a:lstStyle>
+            <a:lvl1pPr marL="0" indent="0">
+              <a:buNone/>
+              <a:defRPr sz="1400"/>
+            </a:lvl1pPr>
+            <a:lvl2pPr marL="457200" indent="0">
+              <a:buNone/>
+              <a:defRPr sz="1200"/>
+            </a:lvl2pPr>
+            <a:lvl3pPr marL="914400" indent="0">
+              <a:buNone/>
+              <a:defRPr sz="1000"/>
+            </a:lvl3pPr>
+            <a:lvl4pPr marL="1371600" indent="0">
+              <a:buNone/>
+              <a:defRPr sz="900"/>
+            </a:lvl4pPr>
+            <a:lvl5pPr marL="1828800" indent="0">
+              <a:buNone/>
+              <a:defRPr sz="900"/>
+            </a:lvl5pPr>
+            <a:lvl6pPr marL="2286000" indent="0">
+              <a:buNone/>
+              <a:defRPr sz="900"/>
+            </a:lvl6pPr>
+            <a:lvl7pPr marL="2743200" indent="0">
+              <a:buNone/>
+              <a:defRPr sz="900"/>
+            </a:lvl7pPr>
+            <a:lvl8pPr marL="3200400" indent="0">
+              <a:buNone/>
+              <a:defRPr sz="900"/>
+            </a:lvl8pPr>
+            <a:lvl9pPr marL="3657600" indent="0">
+              <a:buNone/>
+              <a:defRPr sz="900"/>
+            </a:lvl9pPr>
+          </a:lstStyle>
+          <a:p>
+            <a:pPr lvl="0"/>
+            <a:r>
+              <a:rPr lang="en-US" smtClean="0"/>
+              <a:t>Click to edit Master text styles</a:t>
+            </a:r>
+          </a:p>
+        </p:txBody>
+      </p:sp>
+      <p:sp>
+        <p:nvSpPr>
+          <p:cNvPr id="5" name="Date Placeholder 4"/>
+          <p:cNvSpPr>
+            <a:spLocks noGrp="1"/>
+          </p:cNvSpPr>
+          <p:nvPr>
+            <p:ph type="dt" sz="half" idx="10"/>
+          </p:nvPr>
+        </p:nvSpPr>
+        <p:spPr/>
+        <p:txBody>
+          <a:bodyPr/>
+          <a:lstStyle/>
+          <a:p>
+            <a:fld id="{6E5077B5-BB57-49DB-88CA-226A139E5C01}" type="datetime1">
+              <a:rPr lang="en-US" smtClean="0"/>
+              <a:t>8/20/2015</a:t>
+            </a:fld>
+            <a:endParaRPr lang="en-US"/>
+          </a:p>
+        </p:txBody>
+      </p:sp>
+      <p:sp>
+        <p:nvSpPr>
+          <p:cNvPr id="6" name="Footer Placeholder 5"/>
+          <p:cNvSpPr>
+            <a:spLocks noGrp="1"/>
+          </p:cNvSpPr>
+          <p:nvPr>
+            <p:ph type="ftr" sz="quarter" idx="11"/>
+          </p:nvPr>
+        </p:nvSpPr>
+        <p:spPr/>
+        <p:txBody>
+          <a:bodyPr/>
+          <a:lstStyle/>
+          <a:p>
+            <a:endParaRPr lang="en-US"/>
+          </a:p>
+        </p:txBody>
+      </p:sp>
+      <p:sp>
+        <p:nvSpPr>
+          <p:cNvPr id="7" name="Slide Number Placeholder 6"/>
+          <p:cNvSpPr>
+            <a:spLocks noGrp="1"/>
+          </p:cNvSpPr>
+          <p:nvPr>
+            <p:ph type="sldNum" sz="quarter" idx="12"/>
+          </p:nvPr>
+        </p:nvSpPr>
+        <p:spPr/>
+        <p:txBody>
+          <a:bodyPr/>
+          <a:lstStyle/>
+          <a:p>
+            <a:fld id="{2AF3B5EA-18B6-4040-9F78-6052AF49C681}" type="slidenum">
+              <a:rPr lang="en-US" smtClean="0"/>
+              <a:t>‹#›</a:t>
+            </a:fld>
+            <a:endParaRPr lang="en-US"/>
+          </a:p>
+        </p:txBody>
+      </p:sp>
+    </p:spTree>
+    <p:extLst>
+      <p:ext uri="{BB962C8B-B14F-4D97-AF65-F5344CB8AC3E}">
+        <p14:creationId xmlns:p14="http://schemas.microsoft.com/office/powerpoint/2010/main" val="3350644232"/>
+      </p:ext>
+    </p:extLst>
+  </p:cSld>
+  <p:clrMapOvr>
+    <a:masterClrMapping/>
+  </p:clrMapOvr>
+</p:sldLayout>
+</file>
+
+<file path=ppt/slideLayouts/slideLayout12.xml><?xml version="1.0" encoding="utf-8"?>
 <p:sldLayout xmlns:a="http://schemas.openxmlformats.org/drawingml/2006/main" xmlns:r="http://schemas.openxmlformats.org/officeDocument/2006/relationships" xmlns:p="http://schemas.openxmlformats.org/presentationml/2006/main" type="picTx" preserve="1">
   <p:cSld name="Picture with Caption">
     <p:spTree>
@@ -1675,9 +2051,9 @@
           <a:bodyPr/>
           <a:lstStyle/>
           <a:p>
-            <a:fld id="{6E163653-EADF-47A2-ACFF-C07C3CDF8767}" type="datetime1">
-              <a:rPr lang="en-US" smtClean="0"/>
-              <a:t>8/5/2015</a:t>
+            <a:fld id="{C48D9447-CBD6-49A1-89FD-8512A8CF8999}" type="datetime1">
+              <a:rPr lang="en-US" smtClean="0"/>
+              <a:t>8/20/2015</a:t>
             </a:fld>
             <a:endParaRPr lang="en-US"/>
           </a:p>
@@ -1717,9 +2093,8 @@
           <a:bodyPr/>
           <a:lstStyle/>
           <a:p>
-            <a:fld id="{9F4492BD-6A9C-48FC-AC76-0B4FE11194A1}" type="slidenum">
-              <a:rPr lang="en-US" smtClean="0"/>
-              <a:pPr/>
+            <a:fld id="{2AF3B5EA-18B6-4040-9F78-6052AF49C681}" type="slidenum">
+              <a:rPr lang="en-US" smtClean="0"/>
               <a:t>‹#›</a:t>
             </a:fld>
             <a:endParaRPr lang="en-US"/>
@@ -1727,6 +2102,11 @@
         </p:txBody>
       </p:sp>
     </p:spTree>
+    <p:extLst>
+      <p:ext uri="{BB962C8B-B14F-4D97-AF65-F5344CB8AC3E}">
+        <p14:creationId xmlns:p14="http://schemas.microsoft.com/office/powerpoint/2010/main" val="4153251909"/>
+      </p:ext>
+    </p:extLst>
   </p:cSld>
   <p:clrMapOvr>
     <a:masterClrMapping/>
@@ -1734,7 +2114,7 @@
 </p:sldLayout>
 </file>
 
-<file path=ppt/slideLayouts/slideLayout11.xml><?xml version="1.0" encoding="utf-8"?>
+<file path=ppt/slideLayouts/slideLayout13.xml><?xml version="1.0" encoding="utf-8"?>
 <p:sldLayout xmlns:a="http://schemas.openxmlformats.org/drawingml/2006/main" xmlns:r="http://schemas.openxmlformats.org/officeDocument/2006/relationships" xmlns:p="http://schemas.openxmlformats.org/presentationml/2006/main" type="vertTx" preserve="1">
   <p:cSld name="Title and Vertical Text">
     <p:spTree>
@@ -1841,9 +2221,9 @@
           <a:bodyPr/>
           <a:lstStyle/>
           <a:p>
-            <a:fld id="{E2A60ED6-A19D-4D8D-8712-0EE240CBCDE2}" type="datetime1">
-              <a:rPr lang="en-US" smtClean="0"/>
-              <a:t>8/5/2015</a:t>
+            <a:fld id="{A3639A2A-823D-48B7-9ACE-7FAF42870BA9}" type="datetime1">
+              <a:rPr lang="en-US" smtClean="0"/>
+              <a:t>8/20/2015</a:t>
             </a:fld>
             <a:endParaRPr lang="en-US"/>
           </a:p>
@@ -1883,9 +2263,8 @@
           <a:bodyPr/>
           <a:lstStyle/>
           <a:p>
-            <a:fld id="{9F4492BD-6A9C-48FC-AC76-0B4FE11194A1}" type="slidenum">
-              <a:rPr lang="en-US" smtClean="0"/>
-              <a:pPr/>
+            <a:fld id="{2AF3B5EA-18B6-4040-9F78-6052AF49C681}" type="slidenum">
+              <a:rPr lang="en-US" smtClean="0"/>
               <a:t>‹#›</a:t>
             </a:fld>
             <a:endParaRPr lang="en-US"/>
@@ -1893,6 +2272,11 @@
         </p:txBody>
       </p:sp>
     </p:spTree>
+    <p:extLst>
+      <p:ext uri="{BB962C8B-B14F-4D97-AF65-F5344CB8AC3E}">
+        <p14:creationId xmlns:p14="http://schemas.microsoft.com/office/powerpoint/2010/main" val="609829743"/>
+      </p:ext>
+    </p:extLst>
   </p:cSld>
   <p:clrMapOvr>
     <a:masterClrMapping/>
@@ -1900,7 +2284,7 @@
 </p:sldLayout>
 </file>
 
-<file path=ppt/slideLayouts/slideLayout12.xml><?xml version="1.0" encoding="utf-8"?>
+<file path=ppt/slideLayouts/slideLayout14.xml><?xml version="1.0" encoding="utf-8"?>
 <p:sldLayout xmlns:a="http://schemas.openxmlformats.org/drawingml/2006/main" xmlns:r="http://schemas.openxmlformats.org/officeDocument/2006/relationships" xmlns:p="http://schemas.openxmlformats.org/presentationml/2006/main" type="vertTitleAndTx" preserve="1">
   <p:cSld name="Vertical Title and Text">
     <p:spTree>
@@ -2017,9 +2401,9 @@
           <a:bodyPr/>
           <a:lstStyle/>
           <a:p>
-            <a:fld id="{D768EAF4-17F4-4D82-ACF8-D1E6A60D9205}" type="datetime1">
-              <a:rPr lang="en-US" smtClean="0"/>
-              <a:t>8/5/2015</a:t>
+            <a:fld id="{ED1B6996-82E9-463C-972C-7B56056E426C}" type="datetime1">
+              <a:rPr lang="en-US" smtClean="0"/>
+              <a:t>8/20/2015</a:t>
             </a:fld>
             <a:endParaRPr lang="en-US"/>
           </a:p>
@@ -2059,9 +2443,8 @@
           <a:bodyPr/>
           <a:lstStyle/>
           <a:p>
-            <a:fld id="{9F4492BD-6A9C-48FC-AC76-0B4FE11194A1}" type="slidenum">
-              <a:rPr lang="en-US" smtClean="0"/>
-              <a:pPr/>
+            <a:fld id="{2AF3B5EA-18B6-4040-9F78-6052AF49C681}" type="slidenum">
+              <a:rPr lang="en-US" smtClean="0"/>
               <a:t>‹#›</a:t>
             </a:fld>
             <a:endParaRPr lang="en-US"/>
@@ -2069,6 +2452,11 @@
         </p:txBody>
       </p:sp>
     </p:spTree>
+    <p:extLst>
+      <p:ext uri="{BB962C8B-B14F-4D97-AF65-F5344CB8AC3E}">
+        <p14:creationId xmlns:p14="http://schemas.microsoft.com/office/powerpoint/2010/main" val="2504631927"/>
+      </p:ext>
+    </p:extLst>
   </p:cSld>
   <p:clrMapOvr>
     <a:masterClrMapping/>
@@ -2103,16 +2491,22 @@
             <p:ph type="title"/>
           </p:nvPr>
         </p:nvSpPr>
-        <p:spPr/>
-        <p:txBody>
-          <a:bodyPr/>
-          <a:lstStyle/>
-          <a:p>
-            <a:r>
-              <a:rPr lang="en-US" smtClean="0"/>
+        <p:spPr>
+          <a:ln w="28575">
+            <a:solidFill>
+              <a:schemeClr val="accent1"/>
+            </a:solidFill>
+          </a:ln>
+        </p:spPr>
+        <p:txBody>
+          <a:bodyPr/>
+          <a:lstStyle/>
+          <a:p>
+            <a:r>
+              <a:rPr lang="en-US" dirty="0" smtClean="0"/>
               <a:t>Click to edit Master title style</a:t>
             </a:r>
-            <a:endParaRPr lang="en-US"/>
+            <a:endParaRPr lang="en-US" dirty="0"/>
           </a:p>
         </p:txBody>
       </p:sp>
@@ -2183,9 +2577,9 @@
           <a:bodyPr/>
           <a:lstStyle/>
           <a:p>
-            <a:fld id="{8CAF393D-F814-4D8A-B398-C33AB45084F2}" type="datetime1">
-              <a:rPr lang="en-US" smtClean="0"/>
-              <a:t>8/5/2015</a:t>
+            <a:fld id="{E22ED4DA-448D-4BB1-B935-CC112220207B}" type="datetime1">
+              <a:rPr lang="en-US" smtClean="0"/>
+              <a:t>8/20/2015</a:t>
             </a:fld>
             <a:endParaRPr lang="en-US"/>
           </a:p>
@@ -2225,9 +2619,8 @@
           <a:bodyPr/>
           <a:lstStyle/>
           <a:p>
-            <a:fld id="{9F4492BD-6A9C-48FC-AC76-0B4FE11194A1}" type="slidenum">
-              <a:rPr lang="en-US" smtClean="0"/>
-              <a:pPr/>
+            <a:fld id="{2AF3B5EA-18B6-4040-9F78-6052AF49C681}" type="slidenum">
+              <a:rPr lang="en-US" smtClean="0"/>
               <a:t>‹#›</a:t>
             </a:fld>
             <a:endParaRPr lang="en-US"/>
@@ -2235,6 +2628,11 @@
         </p:txBody>
       </p:sp>
     </p:spTree>
+    <p:extLst>
+      <p:ext uri="{BB962C8B-B14F-4D97-AF65-F5344CB8AC3E}">
+        <p14:creationId xmlns:p14="http://schemas.microsoft.com/office/powerpoint/2010/main" val="3329286698"/>
+      </p:ext>
+    </p:extLst>
   </p:cSld>
   <p:clrMapOvr>
     <a:masterClrMapping/>
@@ -2251,7 +2649,7 @@
 
 <file path=ppt/slideLayouts/slideLayout3.xml><?xml version="1.0" encoding="utf-8"?>
 <p:sldLayout xmlns:a="http://schemas.openxmlformats.org/drawingml/2006/main" xmlns:r="http://schemas.openxmlformats.org/officeDocument/2006/relationships" xmlns:p="http://schemas.openxmlformats.org/presentationml/2006/main" type="obj" preserve="1">
-  <p:cSld name="Code">
+  <p:cSld name="Video">
     <p:spTree>
       <p:nvGrpSpPr>
         <p:cNvPr id="1" name=""/>
@@ -2299,18 +2697,15 @@
             <p:ph idx="1"/>
           </p:nvPr>
         </p:nvSpPr>
-        <p:spPr/>
-        <p:txBody>
-          <a:bodyPr/>
-          <a:lstStyle>
-            <a:lvl1pPr marL="0" indent="0">
-              <a:buNone/>
-              <a:defRPr b="1">
-                <a:latin typeface="Consolas" pitchFamily="49" charset="0"/>
-                <a:cs typeface="Consolas" pitchFamily="49" charset="0"/>
-              </a:defRPr>
-            </a:lvl1pPr>
-          </a:lstStyle>
+        <p:spPr>
+          <a:xfrm>
+            <a:off x="1523999" y="2590798"/>
+            <a:ext cx="6096000" cy="2544763"/>
+          </a:xfrm>
+        </p:spPr>
+        <p:txBody>
+          <a:bodyPr/>
+          <a:lstStyle/>
           <a:p>
             <a:pPr lvl="0"/>
             <a:r>
@@ -2351,6 +2746,48 @@
       </p:sp>
       <p:sp>
         <p:nvSpPr>
+          <p:cNvPr id="4" name="Date Placeholder 3"/>
+          <p:cNvSpPr>
+            <a:spLocks noGrp="1"/>
+          </p:cNvSpPr>
+          <p:nvPr>
+            <p:ph type="dt" sz="half" idx="10"/>
+          </p:nvPr>
+        </p:nvSpPr>
+        <p:spPr/>
+        <p:txBody>
+          <a:bodyPr/>
+          <a:lstStyle/>
+          <a:p>
+            <a:fld id="{E22ED4DA-448D-4BB1-B935-CC112220207B}" type="datetime1">
+              <a:rPr lang="en-US" smtClean="0"/>
+              <a:t>8/20/2015</a:t>
+            </a:fld>
+            <a:endParaRPr lang="en-US"/>
+          </a:p>
+        </p:txBody>
+      </p:sp>
+      <p:sp>
+        <p:nvSpPr>
+          <p:cNvPr id="5" name="Footer Placeholder 4"/>
+          <p:cNvSpPr>
+            <a:spLocks noGrp="1"/>
+          </p:cNvSpPr>
+          <p:nvPr>
+            <p:ph type="ftr" sz="quarter" idx="11"/>
+          </p:nvPr>
+        </p:nvSpPr>
+        <p:spPr/>
+        <p:txBody>
+          <a:bodyPr/>
+          <a:lstStyle/>
+          <a:p>
+            <a:endParaRPr lang="en-US"/>
+          </a:p>
+        </p:txBody>
+      </p:sp>
+      <p:sp>
+        <p:nvSpPr>
           <p:cNvPr id="6" name="Slide Number Placeholder 5"/>
           <p:cNvSpPr>
             <a:spLocks noGrp="1"/>
@@ -2364,19 +2801,102 @@
           <a:bodyPr/>
           <a:lstStyle/>
           <a:p>
-            <a:fld id="{B6F15528-21DE-4FAA-801E-634DDDAF4B2B}" type="slidenum">
-              <a:rPr lang="en-US" smtClean="0"/>
-              <a:pPr/>
+            <a:fld id="{2AF3B5EA-18B6-4040-9F78-6052AF49C681}" type="slidenum">
+              <a:rPr lang="en-US" smtClean="0"/>
               <a:t>‹#›</a:t>
             </a:fld>
             <a:endParaRPr lang="en-US"/>
+          </a:p>
+        </p:txBody>
+      </p:sp>
+      <p:sp>
+        <p:nvSpPr>
+          <p:cNvPr id="7" name="Rectangle 6"/>
+          <p:cNvSpPr/>
+          <p:nvPr userDrawn="1"/>
+        </p:nvSpPr>
+        <p:spPr>
+          <a:xfrm>
+            <a:off x="794551" y="1719223"/>
+            <a:ext cx="7554897" cy="4287915"/>
+          </a:xfrm>
+          <a:prstGeom prst="rect">
+            <a:avLst/>
+          </a:prstGeom>
+          <a:noFill/>
+          <a:ln w="12700">
+            <a:solidFill>
+              <a:schemeClr val="tx1"/>
+            </a:solidFill>
+          </a:ln>
+        </p:spPr>
+        <p:style>
+          <a:lnRef idx="2">
+            <a:schemeClr val="accent1">
+              <a:shade val="50000"/>
+            </a:schemeClr>
+          </a:lnRef>
+          <a:fillRef idx="1">
+            <a:schemeClr val="accent1"/>
+          </a:fillRef>
+          <a:effectRef idx="0">
+            <a:schemeClr val="accent1"/>
+          </a:effectRef>
+          <a:fontRef idx="minor">
+            <a:schemeClr val="lt1"/>
+          </a:fontRef>
+        </p:style>
+        <p:txBody>
+          <a:bodyPr rtlCol="0" anchor="ctr"/>
+          <a:lstStyle/>
+          <a:p>
+            <a:pPr algn="ctr"/>
+            <a:endParaRPr lang="en-US" dirty="0" smtClean="0">
+              <a:solidFill>
+                <a:schemeClr val="tx1"/>
+              </a:solidFill>
+            </a:endParaRPr>
+          </a:p>
+        </p:txBody>
+      </p:sp>
+      <p:sp>
+        <p:nvSpPr>
+          <p:cNvPr id="8" name="TextBox 7"/>
+          <p:cNvSpPr txBox="1"/>
+          <p:nvPr userDrawn="1"/>
+        </p:nvSpPr>
+        <p:spPr>
+          <a:xfrm>
+            <a:off x="5943600" y="1793674"/>
+            <a:ext cx="2286000" cy="646331"/>
+          </a:xfrm>
+          <a:prstGeom prst="rect">
+            <a:avLst/>
+          </a:prstGeom>
+          <a:noFill/>
+        </p:spPr>
+        <p:txBody>
+          <a:bodyPr wrap="square" rtlCol="0">
+            <a:spAutoFit/>
+          </a:bodyPr>
+          <a:lstStyle/>
+          <a:p>
+            <a:r>
+              <a:rPr lang="en-US" dirty="0" smtClean="0"/>
+              <a:t>Resize video to this</a:t>
+            </a:r>
+            <a:r>
+              <a:rPr lang="en-US" baseline="0" dirty="0" smtClean="0"/>
+              <a:t> box.</a:t>
+            </a:r>
+            <a:endParaRPr lang="en-US" dirty="0"/>
           </a:p>
         </p:txBody>
       </p:sp>
     </p:spTree>
     <p:extLst>
       <p:ext uri="{BB962C8B-B14F-4D97-AF65-F5344CB8AC3E}">
-        <p14:creationId xmlns:p14="http://schemas.microsoft.com/office/powerpoint/2010/main" val="3124469201"/>
+        <p14:creationId xmlns:p14="http://schemas.microsoft.com/office/powerpoint/2010/main" val="2822710640"/>
       </p:ext>
     </p:extLst>
   </p:cSld>
@@ -2394,6 +2914,425 @@
 </file>
 
 <file path=ppt/slideLayouts/slideLayout4.xml><?xml version="1.0" encoding="utf-8"?>
+<p:sldLayout xmlns:a="http://schemas.openxmlformats.org/drawingml/2006/main" xmlns:r="http://schemas.openxmlformats.org/officeDocument/2006/relationships" xmlns:p="http://schemas.openxmlformats.org/presentationml/2006/main" type="obj" preserve="1">
+  <p:cSld name="Code">
+    <p:spTree>
+      <p:nvGrpSpPr>
+        <p:cNvPr id="1" name=""/>
+        <p:cNvGrpSpPr/>
+        <p:nvPr/>
+      </p:nvGrpSpPr>
+      <p:grpSpPr>
+        <a:xfrm>
+          <a:off x="0" y="0"/>
+          <a:ext cx="0" cy="0"/>
+          <a:chOff x="0" y="0"/>
+          <a:chExt cx="0" cy="0"/>
+        </a:xfrm>
+      </p:grpSpPr>
+      <p:sp>
+        <p:nvSpPr>
+          <p:cNvPr id="2" name="Title 1"/>
+          <p:cNvSpPr>
+            <a:spLocks noGrp="1"/>
+          </p:cNvSpPr>
+          <p:nvPr>
+            <p:ph type="title"/>
+          </p:nvPr>
+        </p:nvSpPr>
+        <p:spPr/>
+        <p:txBody>
+          <a:bodyPr/>
+          <a:lstStyle/>
+          <a:p>
+            <a:r>
+              <a:rPr lang="en-US" smtClean="0"/>
+              <a:t>Click to edit Master title style</a:t>
+            </a:r>
+            <a:endParaRPr lang="en-US"/>
+          </a:p>
+        </p:txBody>
+      </p:sp>
+      <p:sp>
+        <p:nvSpPr>
+          <p:cNvPr id="3" name="Content Placeholder 2"/>
+          <p:cNvSpPr>
+            <a:spLocks noGrp="1"/>
+          </p:cNvSpPr>
+          <p:nvPr>
+            <p:ph idx="1"/>
+          </p:nvPr>
+        </p:nvSpPr>
+        <p:spPr/>
+        <p:txBody>
+          <a:bodyPr/>
+          <a:lstStyle>
+            <a:lvl1pPr marL="0" indent="0">
+              <a:buNone/>
+              <a:defRPr b="1">
+                <a:latin typeface="Consolas" pitchFamily="49" charset="0"/>
+                <a:cs typeface="Consolas" pitchFamily="49" charset="0"/>
+              </a:defRPr>
+            </a:lvl1pPr>
+          </a:lstStyle>
+          <a:p>
+            <a:pPr lvl="0"/>
+            <a:r>
+              <a:rPr lang="en-US" dirty="0" smtClean="0"/>
+              <a:t>Click to edit Master text styles</a:t>
+            </a:r>
+          </a:p>
+          <a:p>
+            <a:pPr lvl="1"/>
+            <a:r>
+              <a:rPr lang="en-US" dirty="0" smtClean="0"/>
+              <a:t>Second level</a:t>
+            </a:r>
+          </a:p>
+          <a:p>
+            <a:pPr lvl="2"/>
+            <a:r>
+              <a:rPr lang="en-US" dirty="0" smtClean="0"/>
+              <a:t>Third level</a:t>
+            </a:r>
+          </a:p>
+          <a:p>
+            <a:pPr lvl="3"/>
+            <a:r>
+              <a:rPr lang="en-US" dirty="0" smtClean="0"/>
+              <a:t>Fourth level</a:t>
+            </a:r>
+          </a:p>
+          <a:p>
+            <a:pPr lvl="4"/>
+            <a:r>
+              <a:rPr lang="en-US" dirty="0" smtClean="0"/>
+              <a:t>Fifth level</a:t>
+            </a:r>
+            <a:endParaRPr lang="en-US" dirty="0"/>
+          </a:p>
+        </p:txBody>
+      </p:sp>
+      <p:sp>
+        <p:nvSpPr>
+          <p:cNvPr id="4" name="Date Placeholder 3"/>
+          <p:cNvSpPr>
+            <a:spLocks noGrp="1"/>
+          </p:cNvSpPr>
+          <p:nvPr>
+            <p:ph type="dt" sz="half" idx="10"/>
+          </p:nvPr>
+        </p:nvSpPr>
+        <p:spPr/>
+        <p:txBody>
+          <a:bodyPr/>
+          <a:lstStyle/>
+          <a:p>
+            <a:fld id="{FF5D65A6-AB94-4435-B0B7-3743215FA46C}" type="datetime1">
+              <a:rPr lang="en-US" smtClean="0"/>
+              <a:t>8/20/2015</a:t>
+            </a:fld>
+            <a:endParaRPr lang="en-US"/>
+          </a:p>
+        </p:txBody>
+      </p:sp>
+      <p:sp>
+        <p:nvSpPr>
+          <p:cNvPr id="5" name="Footer Placeholder 4"/>
+          <p:cNvSpPr>
+            <a:spLocks noGrp="1"/>
+          </p:cNvSpPr>
+          <p:nvPr>
+            <p:ph type="ftr" sz="quarter" idx="11"/>
+          </p:nvPr>
+        </p:nvSpPr>
+        <p:spPr/>
+        <p:txBody>
+          <a:bodyPr/>
+          <a:lstStyle/>
+          <a:p>
+            <a:endParaRPr lang="en-US"/>
+          </a:p>
+        </p:txBody>
+      </p:sp>
+      <p:sp>
+        <p:nvSpPr>
+          <p:cNvPr id="6" name="Slide Number Placeholder 5"/>
+          <p:cNvSpPr>
+            <a:spLocks noGrp="1"/>
+          </p:cNvSpPr>
+          <p:nvPr>
+            <p:ph type="sldNum" sz="quarter" idx="12"/>
+          </p:nvPr>
+        </p:nvSpPr>
+        <p:spPr/>
+        <p:txBody>
+          <a:bodyPr/>
+          <a:lstStyle/>
+          <a:p>
+            <a:fld id="{2AF3B5EA-18B6-4040-9F78-6052AF49C681}" type="slidenum">
+              <a:rPr lang="en-US" smtClean="0"/>
+              <a:t>‹#›</a:t>
+            </a:fld>
+            <a:endParaRPr lang="en-US"/>
+          </a:p>
+        </p:txBody>
+      </p:sp>
+    </p:spTree>
+    <p:extLst>
+      <p:ext uri="{BB962C8B-B14F-4D97-AF65-F5344CB8AC3E}">
+        <p14:creationId xmlns:p14="http://schemas.microsoft.com/office/powerpoint/2010/main" val="3695283529"/>
+      </p:ext>
+    </p:extLst>
+  </p:cSld>
+  <p:clrMapOvr>
+    <a:masterClrMapping/>
+  </p:clrMapOvr>
+  <p:timing>
+    <p:tnLst>
+      <p:par>
+        <p:cTn id="1" dur="indefinite" restart="never" nodeType="tmRoot"/>
+      </p:par>
+    </p:tnLst>
+  </p:timing>
+</p:sldLayout>
+</file>
+
+<file path=ppt/slideLayouts/slideLayout5.xml><?xml version="1.0" encoding="utf-8"?>
+<p:sldLayout xmlns:a="http://schemas.openxmlformats.org/drawingml/2006/main" xmlns:r="http://schemas.openxmlformats.org/officeDocument/2006/relationships" xmlns:p="http://schemas.openxmlformats.org/presentationml/2006/main" type="obj" preserve="1">
+  <p:cSld name="Video Clip">
+    <p:spTree>
+      <p:nvGrpSpPr>
+        <p:cNvPr id="1" name=""/>
+        <p:cNvGrpSpPr/>
+        <p:nvPr/>
+      </p:nvGrpSpPr>
+      <p:grpSpPr>
+        <a:xfrm>
+          <a:off x="0" y="0"/>
+          <a:ext cx="0" cy="0"/>
+          <a:chOff x="0" y="0"/>
+          <a:chExt cx="0" cy="0"/>
+        </a:xfrm>
+      </p:grpSpPr>
+      <p:sp>
+        <p:nvSpPr>
+          <p:cNvPr id="2" name="Title 1"/>
+          <p:cNvSpPr>
+            <a:spLocks noGrp="1"/>
+          </p:cNvSpPr>
+          <p:nvPr>
+            <p:ph type="title"/>
+          </p:nvPr>
+        </p:nvSpPr>
+        <p:spPr/>
+        <p:txBody>
+          <a:bodyPr/>
+          <a:lstStyle/>
+          <a:p>
+            <a:r>
+              <a:rPr lang="en-US" smtClean="0"/>
+              <a:t>Click to edit Master title style</a:t>
+            </a:r>
+            <a:endParaRPr lang="en-US"/>
+          </a:p>
+        </p:txBody>
+      </p:sp>
+      <p:sp>
+        <p:nvSpPr>
+          <p:cNvPr id="3" name="Content Placeholder 2"/>
+          <p:cNvSpPr>
+            <a:spLocks noGrp="1"/>
+          </p:cNvSpPr>
+          <p:nvPr>
+            <p:ph idx="1"/>
+          </p:nvPr>
+        </p:nvSpPr>
+        <p:spPr/>
+        <p:txBody>
+          <a:bodyPr/>
+          <a:lstStyle>
+            <a:lvl1pPr marL="0" indent="0">
+              <a:buNone/>
+              <a:defRPr b="1">
+                <a:latin typeface="Consolas" pitchFamily="49" charset="0"/>
+                <a:cs typeface="Consolas" pitchFamily="49" charset="0"/>
+              </a:defRPr>
+            </a:lvl1pPr>
+          </a:lstStyle>
+          <a:p>
+            <a:pPr lvl="0"/>
+            <a:r>
+              <a:rPr lang="en-US" dirty="0" smtClean="0"/>
+              <a:t>Click to edit Master text styles</a:t>
+            </a:r>
+          </a:p>
+          <a:p>
+            <a:pPr lvl="1"/>
+            <a:r>
+              <a:rPr lang="en-US" dirty="0" smtClean="0"/>
+              <a:t>Second level</a:t>
+            </a:r>
+          </a:p>
+          <a:p>
+            <a:pPr lvl="2"/>
+            <a:r>
+              <a:rPr lang="en-US" dirty="0" smtClean="0"/>
+              <a:t>Third level</a:t>
+            </a:r>
+          </a:p>
+          <a:p>
+            <a:pPr lvl="3"/>
+            <a:r>
+              <a:rPr lang="en-US" dirty="0" smtClean="0"/>
+              <a:t>Fourth level</a:t>
+            </a:r>
+          </a:p>
+          <a:p>
+            <a:pPr lvl="4"/>
+            <a:r>
+              <a:rPr lang="en-US" dirty="0" smtClean="0"/>
+              <a:t>Fifth level</a:t>
+            </a:r>
+            <a:endParaRPr lang="en-US" dirty="0"/>
+          </a:p>
+        </p:txBody>
+      </p:sp>
+      <p:sp>
+        <p:nvSpPr>
+          <p:cNvPr id="4" name="Date Placeholder 3"/>
+          <p:cNvSpPr>
+            <a:spLocks noGrp="1"/>
+          </p:cNvSpPr>
+          <p:nvPr>
+            <p:ph type="dt" sz="half" idx="10"/>
+          </p:nvPr>
+        </p:nvSpPr>
+        <p:spPr/>
+        <p:txBody>
+          <a:bodyPr/>
+          <a:lstStyle/>
+          <a:p>
+            <a:fld id="{FF5D65A6-AB94-4435-B0B7-3743215FA46C}" type="datetime1">
+              <a:rPr lang="en-US" smtClean="0"/>
+              <a:t>8/20/2015</a:t>
+            </a:fld>
+            <a:endParaRPr lang="en-US"/>
+          </a:p>
+        </p:txBody>
+      </p:sp>
+      <p:sp>
+        <p:nvSpPr>
+          <p:cNvPr id="5" name="Footer Placeholder 4"/>
+          <p:cNvSpPr>
+            <a:spLocks noGrp="1"/>
+          </p:cNvSpPr>
+          <p:nvPr>
+            <p:ph type="ftr" sz="quarter" idx="11"/>
+          </p:nvPr>
+        </p:nvSpPr>
+        <p:spPr/>
+        <p:txBody>
+          <a:bodyPr/>
+          <a:lstStyle/>
+          <a:p>
+            <a:endParaRPr lang="en-US"/>
+          </a:p>
+        </p:txBody>
+      </p:sp>
+      <p:sp>
+        <p:nvSpPr>
+          <p:cNvPr id="7" name="Rectangle 6"/>
+          <p:cNvSpPr/>
+          <p:nvPr userDrawn="1"/>
+        </p:nvSpPr>
+        <p:spPr>
+          <a:xfrm>
+            <a:off x="609600" y="1676400"/>
+            <a:ext cx="7924800" cy="4343400"/>
+          </a:xfrm>
+          <a:prstGeom prst="rect">
+            <a:avLst/>
+          </a:prstGeom>
+          <a:noFill/>
+          <a:ln/>
+        </p:spPr>
+        <p:style>
+          <a:lnRef idx="2">
+            <a:schemeClr val="dk1"/>
+          </a:lnRef>
+          <a:fillRef idx="1">
+            <a:schemeClr val="lt1"/>
+          </a:fillRef>
+          <a:effectRef idx="0">
+            <a:schemeClr val="dk1"/>
+          </a:effectRef>
+          <a:fontRef idx="minor">
+            <a:schemeClr val="dk1"/>
+          </a:fontRef>
+        </p:style>
+        <p:txBody>
+          <a:bodyPr rot="0" spcFirstLastPara="0" vertOverflow="overflow" horzOverflow="overflow" vert="horz" wrap="square" lIns="91440" tIns="45720" rIns="91440" bIns="45720" numCol="1" spcCol="0" rtlCol="0" fromWordArt="0" anchor="ctr" anchorCtr="0" forceAA="0" compatLnSpc="1">
+            <a:prstTxWarp prst="textNoShape">
+              <a:avLst/>
+            </a:prstTxWarp>
+            <a:noAutofit/>
+          </a:bodyPr>
+          <a:lstStyle/>
+          <a:p>
+            <a:pPr algn="ctr"/>
+            <a:endParaRPr lang="en-US" dirty="0">
+              <a:solidFill>
+                <a:schemeClr val="tx1"/>
+              </a:solidFill>
+            </a:endParaRPr>
+          </a:p>
+        </p:txBody>
+      </p:sp>
+      <p:sp>
+        <p:nvSpPr>
+          <p:cNvPr id="6" name="Slide Number Placeholder 5"/>
+          <p:cNvSpPr>
+            <a:spLocks noGrp="1"/>
+          </p:cNvSpPr>
+          <p:nvPr>
+            <p:ph type="sldNum" sz="quarter" idx="12"/>
+          </p:nvPr>
+        </p:nvSpPr>
+        <p:spPr/>
+        <p:txBody>
+          <a:bodyPr/>
+          <a:lstStyle/>
+          <a:p>
+            <a:fld id="{2AF3B5EA-18B6-4040-9F78-6052AF49C681}" type="slidenum">
+              <a:rPr lang="en-US" smtClean="0"/>
+              <a:t>‹#›</a:t>
+            </a:fld>
+            <a:endParaRPr lang="en-US"/>
+          </a:p>
+        </p:txBody>
+      </p:sp>
+    </p:spTree>
+    <p:extLst>
+      <p:ext uri="{BB962C8B-B14F-4D97-AF65-F5344CB8AC3E}">
+        <p14:creationId xmlns:p14="http://schemas.microsoft.com/office/powerpoint/2010/main" val="3911438798"/>
+      </p:ext>
+    </p:extLst>
+  </p:cSld>
+  <p:clrMapOvr>
+    <a:masterClrMapping/>
+  </p:clrMapOvr>
+  <p:timing>
+    <p:tnLst>
+      <p:par>
+        <p:cTn id="1" dur="indefinite" restart="never" nodeType="tmRoot"/>
+      </p:par>
+    </p:tnLst>
+  </p:timing>
+</p:sldLayout>
+</file>
+
+<file path=ppt/slideLayouts/slideLayout6.xml><?xml version="1.0" encoding="utf-8"?>
 <p:sldLayout xmlns:a="http://schemas.openxmlformats.org/drawingml/2006/main" xmlns:r="http://schemas.openxmlformats.org/officeDocument/2006/relationships" xmlns:p="http://schemas.openxmlformats.org/presentationml/2006/main" type="secHead" preserve="1">
   <p:cSld name="Section Header">
     <p:spTree>
@@ -2576,9 +3515,9 @@
           <a:bodyPr/>
           <a:lstStyle/>
           <a:p>
-            <a:fld id="{531EAC2C-3E5E-44E9-AF5F-F741F5A03F36}" type="datetime1">
-              <a:rPr lang="en-US" smtClean="0"/>
-              <a:t>8/5/2015</a:t>
+            <a:fld id="{7C193DC4-6EF0-48C9-B29C-616106A645E1}" type="datetime1">
+              <a:rPr lang="en-US" smtClean="0"/>
+              <a:t>8/20/2015</a:t>
             </a:fld>
             <a:endParaRPr lang="en-US"/>
           </a:p>
@@ -2618,9 +3557,8 @@
           <a:bodyPr/>
           <a:lstStyle/>
           <a:p>
-            <a:fld id="{9F4492BD-6A9C-48FC-AC76-0B4FE11194A1}" type="slidenum">
-              <a:rPr lang="en-US" smtClean="0"/>
-              <a:pPr/>
+            <a:fld id="{2AF3B5EA-18B6-4040-9F78-6052AF49C681}" type="slidenum">
+              <a:rPr lang="en-US" smtClean="0"/>
               <a:t>‹#›</a:t>
             </a:fld>
             <a:endParaRPr lang="en-US"/>
@@ -2628,6 +3566,11 @@
         </p:txBody>
       </p:sp>
     </p:spTree>
+    <p:extLst>
+      <p:ext uri="{BB962C8B-B14F-4D97-AF65-F5344CB8AC3E}">
+        <p14:creationId xmlns:p14="http://schemas.microsoft.com/office/powerpoint/2010/main" val="1179645828"/>
+      </p:ext>
+    </p:extLst>
   </p:cSld>
   <p:clrMapOvr>
     <a:masterClrMapping/>
@@ -2635,7 +3578,7 @@
 </p:sldLayout>
 </file>
 
-<file path=ppt/slideLayouts/slideLayout5.xml><?xml version="1.0" encoding="utf-8"?>
+<file path=ppt/slideLayouts/slideLayout7.xml><?xml version="1.0" encoding="utf-8"?>
 <p:sldLayout xmlns:a="http://schemas.openxmlformats.org/drawingml/2006/main" xmlns:r="http://schemas.openxmlformats.org/officeDocument/2006/relationships" xmlns:p="http://schemas.openxmlformats.org/presentationml/2006/main" type="twoObj" preserve="1">
   <p:cSld name="Two Content">
     <p:spTree>
@@ -2860,9 +3803,9 @@
           <a:bodyPr/>
           <a:lstStyle/>
           <a:p>
-            <a:fld id="{C6C4BD1C-28A7-4C3B-B3E6-41667F1FA900}" type="datetime1">
-              <a:rPr lang="en-US" smtClean="0"/>
-              <a:t>8/5/2015</a:t>
+            <a:fld id="{5D1846AD-9252-4647-9435-4C2AC365653A}" type="datetime1">
+              <a:rPr lang="en-US" smtClean="0"/>
+              <a:t>8/20/2015</a:t>
             </a:fld>
             <a:endParaRPr lang="en-US"/>
           </a:p>
@@ -2902,9 +3845,8 @@
           <a:bodyPr/>
           <a:lstStyle/>
           <a:p>
-            <a:fld id="{9F4492BD-6A9C-48FC-AC76-0B4FE11194A1}" type="slidenum">
-              <a:rPr lang="en-US" smtClean="0"/>
-              <a:pPr/>
+            <a:fld id="{2AF3B5EA-18B6-4040-9F78-6052AF49C681}" type="slidenum">
+              <a:rPr lang="en-US" smtClean="0"/>
               <a:t>‹#›</a:t>
             </a:fld>
             <a:endParaRPr lang="en-US"/>
@@ -2912,21 +3854,19 @@
         </p:txBody>
       </p:sp>
     </p:spTree>
+    <p:extLst>
+      <p:ext uri="{BB962C8B-B14F-4D97-AF65-F5344CB8AC3E}">
+        <p14:creationId xmlns:p14="http://schemas.microsoft.com/office/powerpoint/2010/main" val="428311980"/>
+      </p:ext>
+    </p:extLst>
   </p:cSld>
   <p:clrMapOvr>
     <a:masterClrMapping/>
   </p:clrMapOvr>
-  <p:timing>
-    <p:tnLst>
-      <p:par>
-        <p:cTn id="1" dur="indefinite" restart="never" nodeType="tmRoot"/>
-      </p:par>
-    </p:tnLst>
-  </p:timing>
 </p:sldLayout>
 </file>
 
-<file path=ppt/slideLayouts/slideLayout6.xml><?xml version="1.0" encoding="utf-8"?>
+<file path=ppt/slideLayouts/slideLayout8.xml><?xml version="1.0" encoding="utf-8"?>
 <p:sldLayout xmlns:a="http://schemas.openxmlformats.org/drawingml/2006/main" xmlns:r="http://schemas.openxmlformats.org/officeDocument/2006/relationships" xmlns:p="http://schemas.openxmlformats.org/presentationml/2006/main" type="twoTxTwoObj" preserve="1">
   <p:cSld name="Comparison">
     <p:spTree>
@@ -3285,9 +4225,9 @@
           <a:bodyPr/>
           <a:lstStyle/>
           <a:p>
-            <a:fld id="{2E44E41E-A8F7-42CB-8048-93BC40B32D25}" type="datetime1">
-              <a:rPr lang="en-US" smtClean="0"/>
-              <a:t>8/5/2015</a:t>
+            <a:fld id="{CE56DC10-3561-4063-A6AF-C1CC7A41040A}" type="datetime1">
+              <a:rPr lang="en-US" smtClean="0"/>
+              <a:t>8/20/2015</a:t>
             </a:fld>
             <a:endParaRPr lang="en-US"/>
           </a:p>
@@ -3327,9 +4267,8 @@
           <a:bodyPr/>
           <a:lstStyle/>
           <a:p>
-            <a:fld id="{9F4492BD-6A9C-48FC-AC76-0B4FE11194A1}" type="slidenum">
-              <a:rPr lang="en-US" smtClean="0"/>
-              <a:pPr/>
+            <a:fld id="{2AF3B5EA-18B6-4040-9F78-6052AF49C681}" type="slidenum">
+              <a:rPr lang="en-US" smtClean="0"/>
               <a:t>‹#›</a:t>
             </a:fld>
             <a:endParaRPr lang="en-US"/>
@@ -3337,6 +4276,11 @@
         </p:txBody>
       </p:sp>
     </p:spTree>
+    <p:extLst>
+      <p:ext uri="{BB962C8B-B14F-4D97-AF65-F5344CB8AC3E}">
+        <p14:creationId xmlns:p14="http://schemas.microsoft.com/office/powerpoint/2010/main" val="1801057845"/>
+      </p:ext>
+    </p:extLst>
   </p:cSld>
   <p:clrMapOvr>
     <a:masterClrMapping/>
@@ -3344,7 +4288,7 @@
 </p:sldLayout>
 </file>
 
-<file path=ppt/slideLayouts/slideLayout7.xml><?xml version="1.0" encoding="utf-8"?>
+<file path=ppt/slideLayouts/slideLayout9.xml><?xml version="1.0" encoding="utf-8"?>
 <p:sldLayout xmlns:a="http://schemas.openxmlformats.org/drawingml/2006/main" xmlns:r="http://schemas.openxmlformats.org/officeDocument/2006/relationships" xmlns:p="http://schemas.openxmlformats.org/presentationml/2006/main" type="titleOnly" preserve="1">
   <p:cSld name="Title Only">
     <p:spTree>
@@ -3399,9 +4343,9 @@
           <a:bodyPr/>
           <a:lstStyle/>
           <a:p>
-            <a:fld id="{93F90EC4-37FF-4F0D-8B69-17EA7C785878}" type="datetime1">
-              <a:rPr lang="en-US" smtClean="0"/>
-              <a:t>8/5/2015</a:t>
+            <a:fld id="{2F7B77F5-1464-4F6B-92A8-64FC8A508293}" type="datetime1">
+              <a:rPr lang="en-US" smtClean="0"/>
+              <a:t>8/20/2015</a:t>
             </a:fld>
             <a:endParaRPr lang="en-US"/>
           </a:p>
@@ -3441,9 +4385,8 @@
           <a:bodyPr/>
           <a:lstStyle/>
           <a:p>
-            <a:fld id="{9F4492BD-6A9C-48FC-AC76-0B4FE11194A1}" type="slidenum">
-              <a:rPr lang="en-US" smtClean="0"/>
-              <a:pPr/>
+            <a:fld id="{2AF3B5EA-18B6-4040-9F78-6052AF49C681}" type="slidenum">
+              <a:rPr lang="en-US" smtClean="0"/>
               <a:t>‹#›</a:t>
             </a:fld>
             <a:endParaRPr lang="en-US"/>
@@ -3451,379 +4394,27 @@
         </p:txBody>
       </p:sp>
     </p:spTree>
+    <p:extLst>
+      <p:ext uri="{BB962C8B-B14F-4D97-AF65-F5344CB8AC3E}">
+        <p14:creationId xmlns:p14="http://schemas.microsoft.com/office/powerpoint/2010/main" val="2834723179"/>
+      </p:ext>
+    </p:extLst>
   </p:cSld>
   <p:clrMapOvr>
     <a:masterClrMapping/>
   </p:clrMapOvr>
-</p:sldLayout>
-</file>
-
-<file path=ppt/slideLayouts/slideLayout8.xml><?xml version="1.0" encoding="utf-8"?>
-<p:sldLayout xmlns:a="http://schemas.openxmlformats.org/drawingml/2006/main" xmlns:r="http://schemas.openxmlformats.org/officeDocument/2006/relationships" xmlns:p="http://schemas.openxmlformats.org/presentationml/2006/main" type="blank" preserve="1">
-  <p:cSld name="Blank">
-    <p:spTree>
-      <p:nvGrpSpPr>
-        <p:cNvPr id="1" name=""/>
-        <p:cNvGrpSpPr/>
-        <p:nvPr/>
-      </p:nvGrpSpPr>
-      <p:grpSpPr>
-        <a:xfrm>
-          <a:off x="0" y="0"/>
-          <a:ext cx="0" cy="0"/>
-          <a:chOff x="0" y="0"/>
-          <a:chExt cx="0" cy="0"/>
-        </a:xfrm>
-      </p:grpSpPr>
-      <p:sp>
-        <p:nvSpPr>
-          <p:cNvPr id="2" name="Date Placeholder 1"/>
-          <p:cNvSpPr>
-            <a:spLocks noGrp="1"/>
-          </p:cNvSpPr>
-          <p:nvPr>
-            <p:ph type="dt" sz="half" idx="10"/>
-          </p:nvPr>
-        </p:nvSpPr>
-        <p:spPr/>
-        <p:txBody>
-          <a:bodyPr/>
-          <a:lstStyle/>
-          <a:p>
-            <a:fld id="{9DE6257F-0981-455C-8464-053B4898B074}" type="datetime1">
-              <a:rPr lang="en-US" smtClean="0"/>
-              <a:t>8/5/2015</a:t>
-            </a:fld>
-            <a:endParaRPr lang="en-US"/>
-          </a:p>
-        </p:txBody>
-      </p:sp>
-      <p:sp>
-        <p:nvSpPr>
-          <p:cNvPr id="3" name="Footer Placeholder 2"/>
-          <p:cNvSpPr>
-            <a:spLocks noGrp="1"/>
-          </p:cNvSpPr>
-          <p:nvPr>
-            <p:ph type="ftr" sz="quarter" idx="11"/>
-          </p:nvPr>
-        </p:nvSpPr>
-        <p:spPr/>
-        <p:txBody>
-          <a:bodyPr/>
-          <a:lstStyle/>
-          <a:p>
-            <a:endParaRPr lang="en-US"/>
-          </a:p>
-        </p:txBody>
-      </p:sp>
-      <p:sp>
-        <p:nvSpPr>
-          <p:cNvPr id="4" name="Slide Number Placeholder 3"/>
-          <p:cNvSpPr>
-            <a:spLocks noGrp="1"/>
-          </p:cNvSpPr>
-          <p:nvPr>
-            <p:ph type="sldNum" sz="quarter" idx="12"/>
-          </p:nvPr>
-        </p:nvSpPr>
-        <p:spPr/>
-        <p:txBody>
-          <a:bodyPr/>
-          <a:lstStyle/>
-          <a:p>
-            <a:fld id="{9F4492BD-6A9C-48FC-AC76-0B4FE11194A1}" type="slidenum">
-              <a:rPr lang="en-US" smtClean="0"/>
-              <a:pPr/>
-              <a:t>‹#›</a:t>
-            </a:fld>
-            <a:endParaRPr lang="en-US"/>
-          </a:p>
-        </p:txBody>
-      </p:sp>
-    </p:spTree>
-  </p:cSld>
-  <p:clrMapOvr>
-    <a:masterClrMapping/>
-  </p:clrMapOvr>
-</p:sldLayout>
-</file>
-
-<file path=ppt/slideLayouts/slideLayout9.xml><?xml version="1.0" encoding="utf-8"?>
-<p:sldLayout xmlns:a="http://schemas.openxmlformats.org/drawingml/2006/main" xmlns:r="http://schemas.openxmlformats.org/officeDocument/2006/relationships" xmlns:p="http://schemas.openxmlformats.org/presentationml/2006/main" type="objTx" preserve="1">
-  <p:cSld name="Content with Caption">
-    <p:spTree>
-      <p:nvGrpSpPr>
-        <p:cNvPr id="1" name=""/>
-        <p:cNvGrpSpPr/>
-        <p:nvPr/>
-      </p:nvGrpSpPr>
-      <p:grpSpPr>
-        <a:xfrm>
-          <a:off x="0" y="0"/>
-          <a:ext cx="0" cy="0"/>
-          <a:chOff x="0" y="0"/>
-          <a:chExt cx="0" cy="0"/>
-        </a:xfrm>
-      </p:grpSpPr>
-      <p:sp>
-        <p:nvSpPr>
-          <p:cNvPr id="2" name="Title 1"/>
-          <p:cNvSpPr>
-            <a:spLocks noGrp="1"/>
-          </p:cNvSpPr>
-          <p:nvPr>
-            <p:ph type="title"/>
-          </p:nvPr>
-        </p:nvSpPr>
-        <p:spPr>
-          <a:xfrm>
-            <a:off x="457200" y="273050"/>
-            <a:ext cx="3008313" cy="1162050"/>
-          </a:xfrm>
-        </p:spPr>
-        <p:txBody>
-          <a:bodyPr anchor="b"/>
-          <a:lstStyle>
-            <a:lvl1pPr algn="l">
-              <a:defRPr sz="2000" b="1"/>
-            </a:lvl1pPr>
-          </a:lstStyle>
-          <a:p>
-            <a:r>
-              <a:rPr lang="en-US" smtClean="0"/>
-              <a:t>Click to edit Master title style</a:t>
-            </a:r>
-            <a:endParaRPr lang="en-US"/>
-          </a:p>
-        </p:txBody>
-      </p:sp>
-      <p:sp>
-        <p:nvSpPr>
-          <p:cNvPr id="3" name="Content Placeholder 2"/>
-          <p:cNvSpPr>
-            <a:spLocks noGrp="1"/>
-          </p:cNvSpPr>
-          <p:nvPr>
-            <p:ph idx="1"/>
-          </p:nvPr>
-        </p:nvSpPr>
-        <p:spPr>
-          <a:xfrm>
-            <a:off x="3575050" y="273050"/>
-            <a:ext cx="5111750" cy="5853113"/>
-          </a:xfrm>
-        </p:spPr>
-        <p:txBody>
-          <a:bodyPr/>
-          <a:lstStyle>
-            <a:lvl1pPr>
-              <a:defRPr sz="3200"/>
-            </a:lvl1pPr>
-            <a:lvl2pPr>
-              <a:defRPr sz="2800"/>
-            </a:lvl2pPr>
-            <a:lvl3pPr>
-              <a:defRPr sz="2400"/>
-            </a:lvl3pPr>
-            <a:lvl4pPr>
-              <a:defRPr sz="2000"/>
-            </a:lvl4pPr>
-            <a:lvl5pPr>
-              <a:defRPr sz="2000"/>
-            </a:lvl5pPr>
-            <a:lvl6pPr>
-              <a:defRPr sz="2000"/>
-            </a:lvl6pPr>
-            <a:lvl7pPr>
-              <a:defRPr sz="2000"/>
-            </a:lvl7pPr>
-            <a:lvl8pPr>
-              <a:defRPr sz="2000"/>
-            </a:lvl8pPr>
-            <a:lvl9pPr>
-              <a:defRPr sz="2000"/>
-            </a:lvl9pPr>
-          </a:lstStyle>
-          <a:p>
-            <a:pPr lvl="0"/>
-            <a:r>
-              <a:rPr lang="en-US" smtClean="0"/>
-              <a:t>Click to edit Master text styles</a:t>
-            </a:r>
-          </a:p>
-          <a:p>
-            <a:pPr lvl="1"/>
-            <a:r>
-              <a:rPr lang="en-US" smtClean="0"/>
-              <a:t>Second level</a:t>
-            </a:r>
-          </a:p>
-          <a:p>
-            <a:pPr lvl="2"/>
-            <a:r>
-              <a:rPr lang="en-US" smtClean="0"/>
-              <a:t>Third level</a:t>
-            </a:r>
-          </a:p>
-          <a:p>
-            <a:pPr lvl="3"/>
-            <a:r>
-              <a:rPr lang="en-US" smtClean="0"/>
-              <a:t>Fourth level</a:t>
-            </a:r>
-          </a:p>
-          <a:p>
-            <a:pPr lvl="4"/>
-            <a:r>
-              <a:rPr lang="en-US" smtClean="0"/>
-              <a:t>Fifth level</a:t>
-            </a:r>
-            <a:endParaRPr lang="en-US"/>
-          </a:p>
-        </p:txBody>
-      </p:sp>
-      <p:sp>
-        <p:nvSpPr>
-          <p:cNvPr id="4" name="Text Placeholder 3"/>
-          <p:cNvSpPr>
-            <a:spLocks noGrp="1"/>
-          </p:cNvSpPr>
-          <p:nvPr>
-            <p:ph type="body" sz="half" idx="2"/>
-          </p:nvPr>
-        </p:nvSpPr>
-        <p:spPr>
-          <a:xfrm>
-            <a:off x="457200" y="1435100"/>
-            <a:ext cx="3008313" cy="4691063"/>
-          </a:xfrm>
-        </p:spPr>
-        <p:txBody>
-          <a:bodyPr/>
-          <a:lstStyle>
-            <a:lvl1pPr marL="0" indent="0">
-              <a:buNone/>
-              <a:defRPr sz="1400"/>
-            </a:lvl1pPr>
-            <a:lvl2pPr marL="457200" indent="0">
-              <a:buNone/>
-              <a:defRPr sz="1200"/>
-            </a:lvl2pPr>
-            <a:lvl3pPr marL="914400" indent="0">
-              <a:buNone/>
-              <a:defRPr sz="1000"/>
-            </a:lvl3pPr>
-            <a:lvl4pPr marL="1371600" indent="0">
-              <a:buNone/>
-              <a:defRPr sz="900"/>
-            </a:lvl4pPr>
-            <a:lvl5pPr marL="1828800" indent="0">
-              <a:buNone/>
-              <a:defRPr sz="900"/>
-            </a:lvl5pPr>
-            <a:lvl6pPr marL="2286000" indent="0">
-              <a:buNone/>
-              <a:defRPr sz="900"/>
-            </a:lvl6pPr>
-            <a:lvl7pPr marL="2743200" indent="0">
-              <a:buNone/>
-              <a:defRPr sz="900"/>
-            </a:lvl7pPr>
-            <a:lvl8pPr marL="3200400" indent="0">
-              <a:buNone/>
-              <a:defRPr sz="900"/>
-            </a:lvl8pPr>
-            <a:lvl9pPr marL="3657600" indent="0">
-              <a:buNone/>
-              <a:defRPr sz="900"/>
-            </a:lvl9pPr>
-          </a:lstStyle>
-          <a:p>
-            <a:pPr lvl="0"/>
-            <a:r>
-              <a:rPr lang="en-US" smtClean="0"/>
-              <a:t>Click to edit Master text styles</a:t>
-            </a:r>
-          </a:p>
-        </p:txBody>
-      </p:sp>
-      <p:sp>
-        <p:nvSpPr>
-          <p:cNvPr id="5" name="Date Placeholder 4"/>
-          <p:cNvSpPr>
-            <a:spLocks noGrp="1"/>
-          </p:cNvSpPr>
-          <p:nvPr>
-            <p:ph type="dt" sz="half" idx="10"/>
-          </p:nvPr>
-        </p:nvSpPr>
-        <p:spPr/>
-        <p:txBody>
-          <a:bodyPr/>
-          <a:lstStyle/>
-          <a:p>
-            <a:fld id="{9EDBC604-8964-47C3-982C-A91F79716710}" type="datetime1">
-              <a:rPr lang="en-US" smtClean="0"/>
-              <a:t>8/5/2015</a:t>
-            </a:fld>
-            <a:endParaRPr lang="en-US"/>
-          </a:p>
-        </p:txBody>
-      </p:sp>
-      <p:sp>
-        <p:nvSpPr>
-          <p:cNvPr id="6" name="Footer Placeholder 5"/>
-          <p:cNvSpPr>
-            <a:spLocks noGrp="1"/>
-          </p:cNvSpPr>
-          <p:nvPr>
-            <p:ph type="ftr" sz="quarter" idx="11"/>
-          </p:nvPr>
-        </p:nvSpPr>
-        <p:spPr/>
-        <p:txBody>
-          <a:bodyPr/>
-          <a:lstStyle/>
-          <a:p>
-            <a:endParaRPr lang="en-US"/>
-          </a:p>
-        </p:txBody>
-      </p:sp>
-      <p:sp>
-        <p:nvSpPr>
-          <p:cNvPr id="7" name="Slide Number Placeholder 6"/>
-          <p:cNvSpPr>
-            <a:spLocks noGrp="1"/>
-          </p:cNvSpPr>
-          <p:nvPr>
-            <p:ph type="sldNum" sz="quarter" idx="12"/>
-          </p:nvPr>
-        </p:nvSpPr>
-        <p:spPr/>
-        <p:txBody>
-          <a:bodyPr/>
-          <a:lstStyle/>
-          <a:p>
-            <a:fld id="{9F4492BD-6A9C-48FC-AC76-0B4FE11194A1}" type="slidenum">
-              <a:rPr lang="en-US" smtClean="0"/>
-              <a:pPr/>
-              <a:t>‹#›</a:t>
-            </a:fld>
-            <a:endParaRPr lang="en-US"/>
-          </a:p>
-        </p:txBody>
-      </p:sp>
-    </p:spTree>
-  </p:cSld>
-  <p:clrMapOvr>
-    <a:masterClrMapping/>
-  </p:clrMapOvr>
+  <p:timing>
+    <p:tnLst>
+      <p:par>
+        <p:cTn id="1" dur="indefinite" restart="never" nodeType="tmRoot"/>
+      </p:par>
+    </p:tnLst>
+  </p:timing>
 </p:sldLayout>
 </file>
 
 <file path=ppt/slideMasters/slideMaster1.xml><?xml version="1.0" encoding="utf-8"?>
-<p:sldMaster xmlns:a="http://schemas.openxmlformats.org/drawingml/2006/main" xmlns:r="http://schemas.openxmlformats.org/officeDocument/2006/relationships" xmlns:p="http://schemas.openxmlformats.org/presentationml/2006/main">
+<p:sldMaster xmlns:a="http://schemas.openxmlformats.org/drawingml/2006/main" xmlns:r="http://schemas.openxmlformats.org/officeDocument/2006/relationships" xmlns:p="http://schemas.openxmlformats.org/presentationml/2006/main" preserve="1">
   <p:cSld>
     <p:bg>
       <p:bgRef idx="1001">
@@ -3863,6 +4454,18 @@
             <a:avLst/>
           </a:prstGeom>
         </p:spPr>
+        <p:style>
+          <a:lnRef idx="2">
+            <a:schemeClr val="accent1"/>
+          </a:lnRef>
+          <a:fillRef idx="1">
+            <a:schemeClr val="lt1"/>
+          </a:fillRef>
+          <a:effectRef idx="0">
+            <a:schemeClr val="accent1"/>
+          </a:effectRef>
+          <a:fontRef idx="none"/>
+        </p:style>
         <p:txBody>
           <a:bodyPr vert="horz" lIns="91440" tIns="45720" rIns="91440" bIns="45720" rtlCol="0" anchor="ctr">
             <a:normAutofit/>
@@ -3972,9 +4575,9 @@
             </a:lvl1pPr>
           </a:lstStyle>
           <a:p>
-            <a:fld id="{F84AFAA0-7B6E-411C-9F25-F1156F856933}" type="datetime1">
-              <a:rPr lang="en-US" smtClean="0"/>
-              <a:t>8/5/2015</a:t>
+            <a:fld id="{02B3F677-983B-48DB-ADFD-63FE6CBC7FB2}" type="datetime1">
+              <a:rPr lang="en-US" smtClean="0"/>
+              <a:t>8/20/2015</a:t>
             </a:fld>
             <a:endParaRPr lang="en-US"/>
           </a:p>
@@ -4050,9 +4653,8 @@
             </a:lvl1pPr>
           </a:lstStyle>
           <a:p>
-            <a:fld id="{9F4492BD-6A9C-48FC-AC76-0B4FE11194A1}" type="slidenum">
-              <a:rPr lang="en-US" smtClean="0"/>
-              <a:pPr/>
+            <a:fld id="{2AF3B5EA-18B6-4040-9F78-6052AF49C681}" type="slidenum">
+              <a:rPr lang="en-US" smtClean="0"/>
               <a:t>‹#›</a:t>
             </a:fld>
             <a:endParaRPr lang="en-US"/>
@@ -4060,21 +4662,28 @@
         </p:txBody>
       </p:sp>
     </p:spTree>
+    <p:extLst>
+      <p:ext uri="{BB962C8B-B14F-4D97-AF65-F5344CB8AC3E}">
+        <p14:creationId xmlns:p14="http://schemas.microsoft.com/office/powerpoint/2010/main" val="2944292565"/>
+      </p:ext>
+    </p:extLst>
   </p:cSld>
   <p:clrMap bg1="lt1" tx1="dk1" bg2="lt2" tx2="dk2" accent1="accent1" accent2="accent2" accent3="accent3" accent4="accent4" accent5="accent5" accent6="accent6" hlink="hlink" folHlink="folHlink"/>
   <p:sldLayoutIdLst>
-    <p:sldLayoutId id="2147483649" r:id="rId1"/>
-    <p:sldLayoutId id="2147483650" r:id="rId2"/>
-    <p:sldLayoutId id="2147483660" r:id="rId3"/>
-    <p:sldLayoutId id="2147483651" r:id="rId4"/>
-    <p:sldLayoutId id="2147483652" r:id="rId5"/>
-    <p:sldLayoutId id="2147483653" r:id="rId6"/>
-    <p:sldLayoutId id="2147483654" r:id="rId7"/>
-    <p:sldLayoutId id="2147483655" r:id="rId8"/>
-    <p:sldLayoutId id="2147483656" r:id="rId9"/>
-    <p:sldLayoutId id="2147483657" r:id="rId10"/>
-    <p:sldLayoutId id="2147483658" r:id="rId11"/>
-    <p:sldLayoutId id="2147483659" r:id="rId12"/>
+    <p:sldLayoutId id="2147483662" r:id="rId1"/>
+    <p:sldLayoutId id="2147483663" r:id="rId2"/>
+    <p:sldLayoutId id="2147483664" r:id="rId3"/>
+    <p:sldLayoutId id="2147483665" r:id="rId4"/>
+    <p:sldLayoutId id="2147483666" r:id="rId5"/>
+    <p:sldLayoutId id="2147483667" r:id="rId6"/>
+    <p:sldLayoutId id="2147483668" r:id="rId7"/>
+    <p:sldLayoutId id="2147483669" r:id="rId8"/>
+    <p:sldLayoutId id="2147483670" r:id="rId9"/>
+    <p:sldLayoutId id="2147483671" r:id="rId10"/>
+    <p:sldLayoutId id="2147483672" r:id="rId11"/>
+    <p:sldLayoutId id="2147483673" r:id="rId12"/>
+    <p:sldLayoutId id="2147483674" r:id="rId13"/>
+    <p:sldLayoutId id="2147483675" r:id="rId14"/>
   </p:sldLayoutIdLst>
   <p:timing>
     <p:tnLst>
@@ -4418,6 +5027,30 @@
       </p:sp>
       <p:sp>
         <p:nvSpPr>
+          <p:cNvPr id="5" name="Slide Number Placeholder 4"/>
+          <p:cNvSpPr>
+            <a:spLocks noGrp="1"/>
+          </p:cNvSpPr>
+          <p:nvPr>
+            <p:ph type="sldNum" sz="quarter" idx="12"/>
+          </p:nvPr>
+        </p:nvSpPr>
+        <p:spPr/>
+        <p:txBody>
+          <a:bodyPr/>
+          <a:lstStyle/>
+          <a:p>
+            <a:fld id="{AB376464-0CAE-48CA-94A1-62F8E9374B4C}" type="slidenum">
+              <a:rPr lang="en-US" smtClean="0"/>
+              <a:pPr/>
+              <a:t>1</a:t>
+            </a:fld>
+            <a:endParaRPr lang="en-US"/>
+          </a:p>
+        </p:txBody>
+      </p:sp>
+      <p:sp>
+        <p:nvSpPr>
           <p:cNvPr id="4" name="TextBox 3"/>
           <p:cNvSpPr txBox="1"/>
           <p:nvPr>
@@ -4470,30 +5103,6 @@
               </a:rPr>
               <a:t>A</a:t>
             </a:r>
-            <a:endParaRPr lang="en-US"/>
-          </a:p>
-        </p:txBody>
-      </p:sp>
-      <p:sp>
-        <p:nvSpPr>
-          <p:cNvPr id="5" name="Slide Number Placeholder 4"/>
-          <p:cNvSpPr>
-            <a:spLocks noGrp="1"/>
-          </p:cNvSpPr>
-          <p:nvPr>
-            <p:ph type="sldNum" sz="quarter" idx="12"/>
-          </p:nvPr>
-        </p:nvSpPr>
-        <p:spPr/>
-        <p:txBody>
-          <a:bodyPr/>
-          <a:lstStyle/>
-          <a:p>
-            <a:fld id="{AB376464-0CAE-48CA-94A1-62F8E9374B4C}" type="slidenum">
-              <a:rPr lang="en-US" smtClean="0"/>
-              <a:pPr/>
-              <a:t>1</a:t>
-            </a:fld>
             <a:endParaRPr lang="en-US"/>
           </a:p>
         </p:txBody>
@@ -4825,6 +5434,30 @@
           </a:p>
         </p:txBody>
       </p:sp>
+      <p:sp>
+        <p:nvSpPr>
+          <p:cNvPr id="3" name="Slide Number Placeholder 2"/>
+          <p:cNvSpPr>
+            <a:spLocks noGrp="1"/>
+          </p:cNvSpPr>
+          <p:nvPr>
+            <p:ph type="sldNum" sz="quarter" idx="12"/>
+          </p:nvPr>
+        </p:nvSpPr>
+        <p:spPr/>
+        <p:txBody>
+          <a:bodyPr/>
+          <a:lstStyle/>
+          <a:p>
+            <a:fld id="{9F4492BD-6A9C-48FC-AC76-0B4FE11194A1}" type="slidenum">
+              <a:rPr lang="en-US" smtClean="0"/>
+              <a:pPr/>
+              <a:t>11</a:t>
+            </a:fld>
+            <a:endParaRPr lang="en-US"/>
+          </a:p>
+        </p:txBody>
+      </p:sp>
       <p:pic>
         <p:nvPicPr>
           <p:cNvPr id="1026" name="Picture 2" descr="C:\Users\wand.WAND-326-2009\Desktop\cs5010\13-2-fall\Slides\Images\2-4-beside-and-above.jpg"/>
@@ -4866,30 +5499,6 @@
           </a:extLst>
         </p:spPr>
       </p:pic>
-      <p:sp>
-        <p:nvSpPr>
-          <p:cNvPr id="3" name="Slide Number Placeholder 2"/>
-          <p:cNvSpPr>
-            <a:spLocks noGrp="1"/>
-          </p:cNvSpPr>
-          <p:nvPr>
-            <p:ph type="sldNum" sz="quarter" idx="12"/>
-          </p:nvPr>
-        </p:nvSpPr>
-        <p:spPr/>
-        <p:txBody>
-          <a:bodyPr/>
-          <a:lstStyle/>
-          <a:p>
-            <a:fld id="{9F4492BD-6A9C-48FC-AC76-0B4FE11194A1}" type="slidenum">
-              <a:rPr lang="en-US" smtClean="0"/>
-              <a:pPr/>
-              <a:t>11</a:t>
-            </a:fld>
-            <a:endParaRPr lang="en-US"/>
-          </a:p>
-        </p:txBody>
-      </p:sp>
     </p:spTree>
     <p:extLst>
       <p:ext uri="{BB962C8B-B14F-4D97-AF65-F5344CB8AC3E}">
@@ -4947,6 +5556,30 @@
               <a:t>Slightly more complicated images</a:t>
             </a:r>
             <a:endParaRPr lang="en-US" dirty="0"/>
+          </a:p>
+        </p:txBody>
+      </p:sp>
+      <p:sp>
+        <p:nvSpPr>
+          <p:cNvPr id="3" name="Slide Number Placeholder 2"/>
+          <p:cNvSpPr>
+            <a:spLocks noGrp="1"/>
+          </p:cNvSpPr>
+          <p:nvPr>
+            <p:ph type="sldNum" sz="quarter" idx="12"/>
+          </p:nvPr>
+        </p:nvSpPr>
+        <p:spPr/>
+        <p:txBody>
+          <a:bodyPr/>
+          <a:lstStyle/>
+          <a:p>
+            <a:fld id="{9F4492BD-6A9C-48FC-AC76-0B4FE11194A1}" type="slidenum">
+              <a:rPr lang="en-US" smtClean="0"/>
+              <a:pPr/>
+              <a:t>12</a:t>
+            </a:fld>
+            <a:endParaRPr lang="en-US"/>
           </a:p>
         </p:txBody>
       </p:sp>
@@ -4991,30 +5624,6 @@
           </a:extLst>
         </p:spPr>
       </p:pic>
-      <p:sp>
-        <p:nvSpPr>
-          <p:cNvPr id="3" name="Slide Number Placeholder 2"/>
-          <p:cNvSpPr>
-            <a:spLocks noGrp="1"/>
-          </p:cNvSpPr>
-          <p:nvPr>
-            <p:ph type="sldNum" sz="quarter" idx="12"/>
-          </p:nvPr>
-        </p:nvSpPr>
-        <p:spPr/>
-        <p:txBody>
-          <a:bodyPr/>
-          <a:lstStyle/>
-          <a:p>
-            <a:fld id="{9F4492BD-6A9C-48FC-AC76-0B4FE11194A1}" type="slidenum">
-              <a:rPr lang="en-US" smtClean="0"/>
-              <a:pPr/>
-              <a:t>12</a:t>
-            </a:fld>
-            <a:endParaRPr lang="en-US"/>
-          </a:p>
-        </p:txBody>
-      </p:sp>
     </p:spTree>
     <p:extLst>
       <p:ext uri="{BB962C8B-B14F-4D97-AF65-F5344CB8AC3E}">
@@ -5072,6 +5681,30 @@
               <a:t>Slightly more complicated images</a:t>
             </a:r>
             <a:endParaRPr lang="en-US" dirty="0"/>
+          </a:p>
+        </p:txBody>
+      </p:sp>
+      <p:sp>
+        <p:nvSpPr>
+          <p:cNvPr id="3" name="Slide Number Placeholder 2"/>
+          <p:cNvSpPr>
+            <a:spLocks noGrp="1"/>
+          </p:cNvSpPr>
+          <p:nvPr>
+            <p:ph type="sldNum" sz="quarter" idx="12"/>
+          </p:nvPr>
+        </p:nvSpPr>
+        <p:spPr/>
+        <p:txBody>
+          <a:bodyPr/>
+          <a:lstStyle/>
+          <a:p>
+            <a:fld id="{9F4492BD-6A9C-48FC-AC76-0B4FE11194A1}" type="slidenum">
+              <a:rPr lang="en-US" smtClean="0"/>
+              <a:pPr/>
+              <a:t>13</a:t>
+            </a:fld>
+            <a:endParaRPr lang="en-US"/>
           </a:p>
         </p:txBody>
       </p:sp>
@@ -5116,30 +5749,6 @@
           </a:extLst>
         </p:spPr>
       </p:pic>
-      <p:sp>
-        <p:nvSpPr>
-          <p:cNvPr id="3" name="Slide Number Placeholder 2"/>
-          <p:cNvSpPr>
-            <a:spLocks noGrp="1"/>
-          </p:cNvSpPr>
-          <p:nvPr>
-            <p:ph type="sldNum" sz="quarter" idx="12"/>
-          </p:nvPr>
-        </p:nvSpPr>
-        <p:spPr/>
-        <p:txBody>
-          <a:bodyPr/>
-          <a:lstStyle/>
-          <a:p>
-            <a:fld id="{9F4492BD-6A9C-48FC-AC76-0B4FE11194A1}" type="slidenum">
-              <a:rPr lang="en-US" smtClean="0"/>
-              <a:pPr/>
-              <a:t>13</a:t>
-            </a:fld>
-            <a:endParaRPr lang="en-US"/>
-          </a:p>
-        </p:txBody>
-      </p:sp>
       <p:sp>
         <p:nvSpPr>
           <p:cNvPr id="4" name="TextBox 3"/>
@@ -5498,6 +6107,30 @@
               <a:t>Scene Coordinates</a:t>
             </a:r>
             <a:endParaRPr lang="en-US" dirty="0"/>
+          </a:p>
+        </p:txBody>
+      </p:sp>
+      <p:sp>
+        <p:nvSpPr>
+          <p:cNvPr id="3" name="Slide Number Placeholder 2"/>
+          <p:cNvSpPr>
+            <a:spLocks noGrp="1"/>
+          </p:cNvSpPr>
+          <p:nvPr>
+            <p:ph type="sldNum" sz="quarter" idx="12"/>
+          </p:nvPr>
+        </p:nvSpPr>
+        <p:spPr/>
+        <p:txBody>
+          <a:bodyPr/>
+          <a:lstStyle/>
+          <a:p>
+            <a:fld id="{9F4492BD-6A9C-48FC-AC76-0B4FE11194A1}" type="slidenum">
+              <a:rPr lang="en-US" smtClean="0"/>
+              <a:pPr/>
+              <a:t>15</a:t>
+            </a:fld>
+            <a:endParaRPr lang="en-US"/>
           </a:p>
         </p:txBody>
       </p:sp>
@@ -5707,30 +6340,6 @@
           </a:p>
         </p:txBody>
       </p:sp>
-      <p:sp>
-        <p:nvSpPr>
-          <p:cNvPr id="3" name="Slide Number Placeholder 2"/>
-          <p:cNvSpPr>
-            <a:spLocks noGrp="1"/>
-          </p:cNvSpPr>
-          <p:nvPr>
-            <p:ph type="sldNum" sz="quarter" idx="12"/>
-          </p:nvPr>
-        </p:nvSpPr>
-        <p:spPr/>
-        <p:txBody>
-          <a:bodyPr/>
-          <a:lstStyle/>
-          <a:p>
-            <a:fld id="{9F4492BD-6A9C-48FC-AC76-0B4FE11194A1}" type="slidenum">
-              <a:rPr lang="en-US" smtClean="0"/>
-              <a:pPr/>
-              <a:t>15</a:t>
-            </a:fld>
-            <a:endParaRPr lang="en-US"/>
-          </a:p>
-        </p:txBody>
-      </p:sp>
     </p:spTree>
     <p:extLst>
       <p:ext uri="{BB962C8B-B14F-4D97-AF65-F5344CB8AC3E}">
@@ -6204,15 +6813,7 @@
           <a:p>
             <a:r>
               <a:rPr lang="en-US" dirty="0" smtClean="0"/>
-              <a:t>Creating Scenes with </a:t>
-            </a:r>
-            <a:r>
-              <a:rPr lang="en-US" dirty="0" smtClean="0"/>
-              <a:t>Functions </a:t>
-            </a:r>
-            <a:r>
-              <a:rPr lang="en-US" dirty="0" smtClean="0"/>
-              <a:t>Composition</a:t>
+              <a:t>Creating Scenes with Functions Composition</a:t>
             </a:r>
             <a:endParaRPr lang="en-US" dirty="0"/>
           </a:p>
@@ -6239,23 +6840,8 @@
               <a:rPr lang="en-US" dirty="0" smtClean="0">
                 <a:cs typeface="Courier New" pitchFamily="49" charset="0"/>
               </a:rPr>
-              <a:t>Create </a:t>
-            </a:r>
-            <a:r>
-              <a:rPr lang="en-US" dirty="0" smtClean="0">
-                <a:cs typeface="Courier New" pitchFamily="49" charset="0"/>
-              </a:rPr>
-              <a:t>scenes with images in </a:t>
-            </a:r>
-            <a:r>
-              <a:rPr lang="en-US" dirty="0" smtClean="0">
-                <a:cs typeface="Courier New" pitchFamily="49" charset="0"/>
-              </a:rPr>
-              <a:t>them by combining them with functions.</a:t>
-            </a:r>
-            <a:endParaRPr lang="en-US" dirty="0" smtClean="0">
-              <a:cs typeface="Courier New" pitchFamily="49" charset="0"/>
-            </a:endParaRPr>
+              <a:t>Create scenes with images in them by combining them with functions.</a:t>
+            </a:r>
           </a:p>
           <a:p>
             <a:r>
@@ -6402,8 +6988,8 @@
         </p:blipFill>
         <p:spPr>
           <a:xfrm>
-            <a:off x="1092199" y="1905000"/>
-            <a:ext cx="7179733" cy="4038600"/>
+            <a:off x="2743041" y="2834392"/>
+            <a:ext cx="3657917" cy="2057578"/>
           </a:xfrm>
           <a:prstGeom prst="rect">
             <a:avLst/>
@@ -6555,11 +7141,7 @@
           <a:p>
             <a:r>
               <a:rPr lang="en-US" dirty="0" smtClean="0"/>
-              <a:t>In this lesson, we will explore a few things from the library</a:t>
-            </a:r>
-            <a:r>
-              <a:rPr lang="en-US" dirty="0" smtClean="0"/>
-              <a:t>.</a:t>
+              <a:t>In this lesson, we will explore a few things from the library.</a:t>
             </a:r>
           </a:p>
           <a:p>
@@ -7127,6 +7709,30 @@
           </a:ln>
         </p:spPr>
       </p:pic>
+      <p:sp>
+        <p:nvSpPr>
+          <p:cNvPr id="3" name="Slide Number Placeholder 2"/>
+          <p:cNvSpPr>
+            <a:spLocks noGrp="1"/>
+          </p:cNvSpPr>
+          <p:nvPr>
+            <p:ph type="sldNum" sz="quarter" idx="12"/>
+          </p:nvPr>
+        </p:nvSpPr>
+        <p:spPr/>
+        <p:txBody>
+          <a:bodyPr/>
+          <a:lstStyle/>
+          <a:p>
+            <a:fld id="{9F4492BD-6A9C-48FC-AC76-0B4FE11194A1}" type="slidenum">
+              <a:rPr lang="en-US" smtClean="0"/>
+              <a:pPr/>
+              <a:t>22</a:t>
+            </a:fld>
+            <a:endParaRPr lang="en-US"/>
+          </a:p>
+        </p:txBody>
+      </p:sp>
       <p:cxnSp>
         <p:nvCxnSpPr>
           <p:cNvPr id="7" name="Straight Connector 6"/>
@@ -7916,30 +8522,6 @@
           </a:p>
         </p:txBody>
       </p:sp>
-      <p:sp>
-        <p:nvSpPr>
-          <p:cNvPr id="3" name="Slide Number Placeholder 2"/>
-          <p:cNvSpPr>
-            <a:spLocks noGrp="1"/>
-          </p:cNvSpPr>
-          <p:nvPr>
-            <p:ph type="sldNum" sz="quarter" idx="12"/>
-          </p:nvPr>
-        </p:nvSpPr>
-        <p:spPr/>
-        <p:txBody>
-          <a:bodyPr/>
-          <a:lstStyle/>
-          <a:p>
-            <a:fld id="{9F4492BD-6A9C-48FC-AC76-0B4FE11194A1}" type="slidenum">
-              <a:rPr lang="en-US" smtClean="0"/>
-              <a:pPr/>
-              <a:t>22</a:t>
-            </a:fld>
-            <a:endParaRPr lang="en-US"/>
-          </a:p>
-        </p:txBody>
-      </p:sp>
     </p:spTree>
     <p:extLst>
       <p:ext uri="{BB962C8B-B14F-4D97-AF65-F5344CB8AC3E}">
@@ -9017,8 +9599,17 @@
           <a:p>
             <a:r>
               <a:rPr lang="en-US" dirty="0" smtClean="0"/>
-              <a:t>If you have questions or comments about this lesson, post them on the discussion board.</a:t>
-            </a:r>
+              <a:t>If you have questions or comments about this lesson, post them on the discussion </a:t>
+            </a:r>
+            <a:r>
+              <a:rPr lang="en-US" smtClean="0"/>
+              <a:t>board</a:t>
+            </a:r>
+            <a:r>
+              <a:rPr lang="en-US" smtClean="0"/>
+              <a:t>.</a:t>
+            </a:r>
+            <a:endParaRPr lang="en-US" dirty="0" smtClean="0"/>
           </a:p>
         </p:txBody>
       </p:sp>
@@ -9305,11 +9896,7 @@
           <a:p>
             <a:r>
               <a:rPr lang="en-US" dirty="0" smtClean="0"/>
-              <a:t>In general, we build complex images by starting with simple images and then combining them using </a:t>
-            </a:r>
-            <a:r>
-              <a:rPr lang="en-US" dirty="0" smtClean="0"/>
-              <a:t>functions.</a:t>
+              <a:t>In general, we build complex images by starting with simple images and then combining them using functions.</a:t>
             </a:r>
             <a:endParaRPr lang="en-US" dirty="0"/>
           </a:p>
@@ -10176,7 +10763,7 @@
 </file>
 
 <file path=ppt/theme/theme1.xml><?xml version="1.0" encoding="utf-8"?>
-<a:theme xmlns:a="http://schemas.openxmlformats.org/drawingml/2006/main" name="Office Theme">
+<a:theme xmlns:a="http://schemas.openxmlformats.org/drawingml/2006/main" name="1_Office Theme">
   <a:themeElements>
     <a:clrScheme name="Office">
       <a:dk1>
@@ -10250,6 +10837,7 @@
         <a:font script="Mong" typeface="Mongolian Baiti"/>
         <a:font script="Viet" typeface="Times New Roman"/>
         <a:font script="Uigh" typeface="Microsoft Uighur"/>
+        <a:font script="Geor" typeface="Sylfaen"/>
       </a:majorFont>
       <a:minorFont>
         <a:latin typeface="Calibri"/>
@@ -10284,6 +10872,7 @@
         <a:font script="Mong" typeface="Mongolian Baiti"/>
         <a:font script="Viet" typeface="Arial"/>
         <a:font script="Uigh" typeface="Microsoft Uighur"/>
+        <a:font script="Geor" typeface="Sylfaen"/>
       </a:minorFont>
     </a:fontScheme>
     <a:fmtScheme name="Office">
@@ -10453,7 +11042,48 @@
       </a:bgFillStyleLst>
     </a:fmtScheme>
   </a:themeElements>
-  <a:objectDefaults/>
+  <a:objectDefaults>
+    <a:spDef>
+      <a:spPr>
+        <a:solidFill>
+          <a:schemeClr val="accent3">
+            <a:lumMod val="40000"/>
+            <a:lumOff val="60000"/>
+          </a:schemeClr>
+        </a:solidFill>
+        <a:ln/>
+      </a:spPr>
+      <a:bodyPr rot="0" spcFirstLastPara="0" vertOverflow="overflow" horzOverflow="overflow" vert="horz" wrap="square" lIns="91440" tIns="45720" rIns="91440" bIns="45720" numCol="1" spcCol="0" rtlCol="0" fromWordArt="0" anchor="ctr" anchorCtr="0" forceAA="0" compatLnSpc="1">
+        <a:prstTxWarp prst="textNoShape">
+          <a:avLst/>
+        </a:prstTxWarp>
+        <a:noAutofit/>
+      </a:bodyPr>
+      <a:lstStyle>
+        <a:defPPr>
+          <a:defRPr dirty="0">
+            <a:solidFill>
+              <a:schemeClr val="tx1"/>
+            </a:solidFill>
+          </a:defRPr>
+        </a:defPPr>
+      </a:lstStyle>
+      <a:style>
+        <a:lnRef idx="2">
+          <a:schemeClr val="accent1"/>
+        </a:lnRef>
+        <a:fillRef idx="1">
+          <a:schemeClr val="lt1"/>
+        </a:fillRef>
+        <a:effectRef idx="0">
+          <a:schemeClr val="accent1"/>
+        </a:effectRef>
+        <a:fontRef idx="minor">
+          <a:schemeClr val="dk1"/>
+        </a:fontRef>
+      </a:style>
+    </a:spDef>
+  </a:objectDefaults>
   <a:extraClrSchemeLst/>
 </a:theme>
 </file>

</xml_diff>